<commit_message>
docs: changes in documentation
</commit_message>
<xml_diff>
--- a/resources/smart Video Solutions using Edge AI for fashion.pptx
+++ b/resources/smart Video Solutions using Edge AI for fashion.pptx
@@ -364,7 +364,7 @@
           <a:p>
             <a:fld id="{ED291B17-9318-49DB-B28B-6E5994AE9581}" type="datetime1">
               <a:rPr lang="en-US" smtClean="0"/>
-              <a:t>7/7/2020</a:t>
+              <a:t>7/8/2020</a:t>
             </a:fld>
             <a:endParaRPr lang="en-US" dirty="0"/>
           </a:p>
@@ -567,7 +567,7 @@
           <a:p>
             <a:fld id="{2CED4963-E985-44C4-B8C4-FDD613B7C2F8}" type="datetime1">
               <a:rPr lang="en-US" smtClean="0"/>
-              <a:t>7/7/2020</a:t>
+              <a:t>7/8/2020</a:t>
             </a:fld>
             <a:endParaRPr lang="en-US" dirty="0"/>
           </a:p>
@@ -929,7 +929,7 @@
           <a:p>
             <a:fld id="{ED291B17-9318-49DB-B28B-6E5994AE9581}" type="datetime1">
               <a:rPr lang="en-US" smtClean="0"/>
-              <a:t>7/7/2020</a:t>
+              <a:t>7/8/2020</a:t>
             </a:fld>
             <a:endParaRPr lang="en-US" dirty="0"/>
           </a:p>
@@ -1127,7 +1127,7 @@
           <a:p>
             <a:fld id="{78DD82B9-B8EE-4375-B6FF-88FA6ABB15D9}" type="datetime1">
               <a:rPr lang="en-US" smtClean="0"/>
-              <a:t>7/7/2020</a:t>
+              <a:t>7/8/2020</a:t>
             </a:fld>
             <a:endParaRPr lang="en-US" dirty="0"/>
           </a:p>
@@ -1439,7 +1439,7 @@
           <a:p>
             <a:fld id="{B2497495-0637-405E-AE64-5CC7506D51F5}" type="datetime1">
               <a:rPr lang="en-US" smtClean="0"/>
-              <a:t>7/7/2020</a:t>
+              <a:t>7/8/2020</a:t>
             </a:fld>
             <a:endParaRPr lang="en-US" dirty="0"/>
           </a:p>
@@ -1692,7 +1692,7 @@
           <a:p>
             <a:fld id="{7BFFD690-9426-415D-8B65-26881E07B2D4}" type="datetime1">
               <a:rPr lang="en-US" smtClean="0"/>
-              <a:t>7/7/2020</a:t>
+              <a:t>7/8/2020</a:t>
             </a:fld>
             <a:endParaRPr lang="en-US" dirty="0"/>
           </a:p>
@@ -2114,7 +2114,7 @@
           <a:p>
             <a:fld id="{04C4989A-474C-40DE-95B9-011C28B71673}" type="datetime1">
               <a:rPr lang="en-US" smtClean="0"/>
-              <a:t>7/7/2020</a:t>
+              <a:t>7/8/2020</a:t>
             </a:fld>
             <a:endParaRPr lang="en-US" dirty="0"/>
           </a:p>
@@ -2237,7 +2237,7 @@
           <a:p>
             <a:fld id="{5DB4ED54-5B5E-4A04-93D3-5772E3CE3818}" type="datetime1">
               <a:rPr lang="en-US" smtClean="0"/>
-              <a:t>7/7/2020</a:t>
+              <a:t>7/8/2020</a:t>
             </a:fld>
             <a:endParaRPr lang="en-US" dirty="0"/>
           </a:p>
@@ -2332,7 +2332,7 @@
           <a:p>
             <a:fld id="{4EDE50D6-574B-40AF-946F-D52A04ADE379}" type="datetime1">
               <a:rPr lang="en-US" smtClean="0"/>
-              <a:t>7/7/2020</a:t>
+              <a:t>7/8/2020</a:t>
             </a:fld>
             <a:endParaRPr lang="en-US" dirty="0"/>
           </a:p>
@@ -2709,7 +2709,7 @@
           <a:p>
             <a:fld id="{D82884F1-FFEA-405F-9602-3DCA865EDA4E}" type="datetime1">
               <a:rPr lang="en-US" smtClean="0"/>
-              <a:t>7/7/2020</a:t>
+              <a:t>7/8/2020</a:t>
             </a:fld>
             <a:endParaRPr lang="en-US" dirty="0"/>
           </a:p>
@@ -3002,7 +3002,7 @@
           <a:p>
             <a:fld id="{7E18DB4A-8810-4A10-AD5C-D5E2C667F5B3}" type="datetime1">
               <a:rPr lang="en-US" smtClean="0"/>
-              <a:t>7/7/2020</a:t>
+              <a:t>7/8/2020</a:t>
             </a:fld>
             <a:endParaRPr lang="en-US" dirty="0"/>
           </a:p>
@@ -3217,7 +3217,7 @@
           <a:p>
             <a:fld id="{ED291B17-9318-49DB-B28B-6E5994AE9581}" type="datetime1">
               <a:rPr lang="en-US" smtClean="0"/>
-              <a:t>7/7/2020</a:t>
+              <a:t>7/8/2020</a:t>
             </a:fld>
             <a:endParaRPr lang="en-US" dirty="0"/>
           </a:p>
@@ -4544,7 +4544,9 @@
         </p:nvSpPr>
         <p:spPr/>
         <p:txBody>
-          <a:bodyPr/>
+          <a:bodyPr>
+            <a:normAutofit lnSpcReduction="10000"/>
+          </a:bodyPr>
           <a:lstStyle/>
           <a:p>
             <a:pPr>
@@ -4553,7 +4555,31 @@
             </a:pPr>
             <a:r>
               <a:rPr lang="en-US" dirty="0"/>
-              <a:t>A cost effective people counting system which not only counts the number of people but also generates and inputs data in a database with ease.</a:t>
+              <a:t>A cost effective people counting system which not only counts the number of people but also generates and inputs data in a database with ease. </a:t>
+            </a:r>
+            <a:r>
+              <a:rPr lang="en-US" u="sng" dirty="0"/>
+              <a:t>And this is a perfect replacement for all </a:t>
+            </a:r>
+            <a:r>
+              <a:rPr lang="en-US" u="sng"/>
+              <a:t>the costly complex </a:t>
+            </a:r>
+            <a:r>
+              <a:rPr lang="en-US" u="sng" dirty="0"/>
+              <a:t>sensor technologies and usage of cloud services such as [</a:t>
+            </a:r>
+            <a:r>
+              <a:rPr lang="en-US" b="1" u="sng" dirty="0"/>
+              <a:t>AWS, Azure, IBM Watson, Google Cloud Platform</a:t>
+            </a:r>
+            <a:r>
+              <a:rPr lang="en-US" u="sng" dirty="0"/>
+              <a:t>] for AI inference</a:t>
+            </a:r>
+            <a:r>
+              <a:rPr lang="en-US" dirty="0"/>
+              <a:t>.</a:t>
             </a:r>
           </a:p>
           <a:p>
@@ -4583,15 +4609,7 @@
             </a:pPr>
             <a:r>
               <a:rPr lang="en-US" dirty="0"/>
-              <a:t>This will help in investing on right products for better sales and most importantly customer feedback which helps in improving store’s </a:t>
-            </a:r>
-            <a:r>
-              <a:rPr lang="en-US"/>
-              <a:t>performance time </a:t>
-            </a:r>
-            <a:r>
-              <a:rPr lang="en-US" dirty="0"/>
-              <a:t>to time.</a:t>
+              <a:t>This will help in investing on right products for better sales and most importantly customer feedback which helps in improving store’s performance time to time.</a:t>
             </a:r>
           </a:p>
           <a:p>
@@ -6485,7 +6503,7 @@
             </a:pPr>
             <a:r>
               <a:rPr lang="en-US" dirty="0"/>
-              <a:t>We have to enter total people counted and number of transactions happened in a day to calculate conversion rate.   </a:t>
+              <a:t>We have to enter number of transactions happened in a day to calculate conversion rate.   </a:t>
             </a:r>
             <a:r>
               <a:rPr lang="en-US" b="1" dirty="0"/>
@@ -6493,7 +6511,7 @@
             </a:r>
             <a:r>
               <a:rPr lang="en-US" dirty="0"/>
-              <a:t>. The data [date, people counted, transactions, conversion rate] will be send to the database.</a:t>
+              <a:t>. The data [date, people counted, transactions, conversion rate] will be send to the database everyday automatically.</a:t>
             </a:r>
           </a:p>
           <a:p>

</xml_diff>